<commit_message>
changement de power point (mauvaise manip)
</commit_message>
<xml_diff>
--- a/runner.pptx
+++ b/runner.pptx
@@ -6,10 +6,14 @@
   </p:sldMasterIdLst>
   <p:sldIdLst>
     <p:sldId id="261" r:id="rId2"/>
-    <p:sldId id="259" r:id="rId3"/>
-    <p:sldId id="258" r:id="rId4"/>
-    <p:sldId id="257" r:id="rId5"/>
-    <p:sldId id="260" r:id="rId6"/>
+    <p:sldId id="264" r:id="rId3"/>
+    <p:sldId id="263" r:id="rId4"/>
+    <p:sldId id="259" r:id="rId5"/>
+    <p:sldId id="258" r:id="rId6"/>
+    <p:sldId id="257" r:id="rId7"/>
+    <p:sldId id="260" r:id="rId8"/>
+    <p:sldId id="262" r:id="rId9"/>
+    <p:sldId id="265" r:id="rId10"/>
   </p:sldIdLst>
   <p:sldSz cx="12192000" cy="6858000"/>
   <p:notesSz cx="6858000" cy="9144000"/>
@@ -108,6 +112,22 @@
       </a:defRPr>
     </a:lvl9pPr>
   </p:defaultTextStyle>
+  <p:extLst>
+    <p:ext uri="{EFAFB233-063F-42B5-8137-9DF3F51BA10A}">
+      <p15:sldGuideLst xmlns:p15="http://schemas.microsoft.com/office/powerpoint/2012/main">
+        <p15:guide id="1" orient="horz" pos="2160">
+          <p15:clr>
+            <a:srgbClr val="A4A3A4"/>
+          </p15:clr>
+        </p15:guide>
+        <p15:guide id="2" pos="3840">
+          <p15:clr>
+            <a:srgbClr val="A4A3A4"/>
+          </p15:clr>
+        </p15:guide>
+      </p15:sldGuideLst>
+    </p:ext>
+  </p:extLst>
 </p:presentation>
 </file>
 
@@ -281,7 +301,8 @@
           <a:p>
             <a:fld id="{B09A78FF-4AD8-4119-9AEB-2EBDEBEAE2E7}" type="datetimeFigureOut">
               <a:rPr lang="fr-FR" smtClean="0"/>
-              <a:t>20/04/2016</a:t>
+              <a:pPr/>
+              <a:t>21/04/2016</a:t>
             </a:fld>
             <a:endParaRPr lang="fr-FR"/>
           </a:p>
@@ -333,6 +354,7 @@
           <a:p>
             <a:fld id="{360FC94D-EAAC-4AD0-BE8D-24600246B7D2}" type="slidenum">
               <a:rPr lang="fr-FR" smtClean="0"/>
+              <a:pPr/>
               <a:t>‹N°›</a:t>
             </a:fld>
             <a:endParaRPr lang="fr-FR"/>
@@ -548,7 +570,8 @@
           <a:p>
             <a:fld id="{B09A78FF-4AD8-4119-9AEB-2EBDEBEAE2E7}" type="datetimeFigureOut">
               <a:rPr lang="fr-FR" smtClean="0"/>
-              <a:t>20/04/2016</a:t>
+              <a:pPr/>
+              <a:t>21/04/2016</a:t>
             </a:fld>
             <a:endParaRPr lang="fr-FR"/>
           </a:p>
@@ -590,6 +613,7 @@
           <a:p>
             <a:fld id="{360FC94D-EAAC-4AD0-BE8D-24600246B7D2}" type="slidenum">
               <a:rPr lang="fr-FR" smtClean="0"/>
+              <a:pPr/>
               <a:t>‹N°›</a:t>
             </a:fld>
             <a:endParaRPr lang="fr-FR"/>
@@ -779,7 +803,8 @@
           <a:p>
             <a:fld id="{B09A78FF-4AD8-4119-9AEB-2EBDEBEAE2E7}" type="datetimeFigureOut">
               <a:rPr lang="fr-FR" smtClean="0"/>
-              <a:t>20/04/2016</a:t>
+              <a:pPr/>
+              <a:t>21/04/2016</a:t>
             </a:fld>
             <a:endParaRPr lang="fr-FR"/>
           </a:p>
@@ -831,6 +856,7 @@
           <a:p>
             <a:fld id="{360FC94D-EAAC-4AD0-BE8D-24600246B7D2}" type="slidenum">
               <a:rPr lang="fr-FR" smtClean="0"/>
+              <a:pPr/>
               <a:t>‹N°›</a:t>
             </a:fld>
             <a:endParaRPr lang="fr-FR"/>
@@ -1089,7 +1115,8 @@
           <a:p>
             <a:fld id="{B09A78FF-4AD8-4119-9AEB-2EBDEBEAE2E7}" type="datetimeFigureOut">
               <a:rPr lang="fr-FR" smtClean="0"/>
-              <a:t>20/04/2016</a:t>
+              <a:pPr/>
+              <a:t>21/04/2016</a:t>
             </a:fld>
             <a:endParaRPr lang="fr-FR"/>
           </a:p>
@@ -1141,6 +1168,7 @@
           <a:p>
             <a:fld id="{360FC94D-EAAC-4AD0-BE8D-24600246B7D2}" type="slidenum">
               <a:rPr lang="fr-FR" smtClean="0"/>
+              <a:pPr/>
               <a:t>‹N°›</a:t>
             </a:fld>
             <a:endParaRPr lang="fr-FR"/>
@@ -1562,7 +1590,8 @@
           <a:p>
             <a:fld id="{B09A78FF-4AD8-4119-9AEB-2EBDEBEAE2E7}" type="datetimeFigureOut">
               <a:rPr lang="fr-FR" smtClean="0"/>
-              <a:t>20/04/2016</a:t>
+              <a:pPr/>
+              <a:t>21/04/2016</a:t>
             </a:fld>
             <a:endParaRPr lang="fr-FR"/>
           </a:p>
@@ -1614,6 +1643,7 @@
           <a:p>
             <a:fld id="{360FC94D-EAAC-4AD0-BE8D-24600246B7D2}" type="slidenum">
               <a:rPr lang="fr-FR" smtClean="0"/>
+              <a:pPr/>
               <a:t>‹N°›</a:t>
             </a:fld>
             <a:endParaRPr lang="fr-FR"/>
@@ -2109,7 +2139,8 @@
           <a:p>
             <a:fld id="{B09A78FF-4AD8-4119-9AEB-2EBDEBEAE2E7}" type="datetimeFigureOut">
               <a:rPr lang="fr-FR" smtClean="0"/>
-              <a:t>20/04/2016</a:t>
+              <a:pPr/>
+              <a:t>21/04/2016</a:t>
             </a:fld>
             <a:endParaRPr lang="fr-FR"/>
           </a:p>
@@ -2151,6 +2182,7 @@
           <a:p>
             <a:fld id="{360FC94D-EAAC-4AD0-BE8D-24600246B7D2}" type="slidenum">
               <a:rPr lang="fr-FR" smtClean="0"/>
+              <a:pPr/>
               <a:t>‹N°›</a:t>
             </a:fld>
             <a:endParaRPr lang="fr-FR"/>
@@ -2883,7 +2915,8 @@
           <a:p>
             <a:fld id="{B09A78FF-4AD8-4119-9AEB-2EBDEBEAE2E7}" type="datetimeFigureOut">
               <a:rPr lang="fr-FR" smtClean="0"/>
-              <a:t>20/04/2016</a:t>
+              <a:pPr/>
+              <a:t>21/04/2016</a:t>
             </a:fld>
             <a:endParaRPr lang="fr-FR"/>
           </a:p>
@@ -2925,6 +2958,7 @@
           <a:p>
             <a:fld id="{360FC94D-EAAC-4AD0-BE8D-24600246B7D2}" type="slidenum">
               <a:rPr lang="fr-FR" smtClean="0"/>
+              <a:pPr/>
               <a:t>‹N°›</a:t>
             </a:fld>
             <a:endParaRPr lang="fr-FR"/>
@@ -3058,7 +3092,8 @@
           <a:p>
             <a:fld id="{B09A78FF-4AD8-4119-9AEB-2EBDEBEAE2E7}" type="datetimeFigureOut">
               <a:rPr lang="fr-FR" smtClean="0"/>
-              <a:t>20/04/2016</a:t>
+              <a:pPr/>
+              <a:t>21/04/2016</a:t>
             </a:fld>
             <a:endParaRPr lang="fr-FR"/>
           </a:p>
@@ -3100,6 +3135,7 @@
           <a:p>
             <a:fld id="{360FC94D-EAAC-4AD0-BE8D-24600246B7D2}" type="slidenum">
               <a:rPr lang="fr-FR" smtClean="0"/>
+              <a:pPr/>
               <a:t>‹N°›</a:t>
             </a:fld>
             <a:endParaRPr lang="fr-FR"/>
@@ -3281,7 +3317,8 @@
           <a:p>
             <a:fld id="{B09A78FF-4AD8-4119-9AEB-2EBDEBEAE2E7}" type="datetimeFigureOut">
               <a:rPr lang="fr-FR" smtClean="0"/>
-              <a:t>20/04/2016</a:t>
+              <a:pPr/>
+              <a:t>21/04/2016</a:t>
             </a:fld>
             <a:endParaRPr lang="fr-FR"/>
           </a:p>
@@ -3333,6 +3370,7 @@
           <a:p>
             <a:fld id="{360FC94D-EAAC-4AD0-BE8D-24600246B7D2}" type="slidenum">
               <a:rPr lang="fr-FR" smtClean="0"/>
+              <a:pPr/>
               <a:t>‹N°›</a:t>
             </a:fld>
             <a:endParaRPr lang="fr-FR"/>
@@ -3461,7 +3499,8 @@
           <a:p>
             <a:fld id="{B09A78FF-4AD8-4119-9AEB-2EBDEBEAE2E7}" type="datetimeFigureOut">
               <a:rPr lang="fr-FR" smtClean="0"/>
-              <a:t>20/04/2016</a:t>
+              <a:pPr/>
+              <a:t>21/04/2016</a:t>
             </a:fld>
             <a:endParaRPr lang="fr-FR"/>
           </a:p>
@@ -3503,6 +3542,7 @@
           <a:p>
             <a:fld id="{360FC94D-EAAC-4AD0-BE8D-24600246B7D2}" type="slidenum">
               <a:rPr lang="fr-FR" smtClean="0"/>
+              <a:pPr/>
               <a:t>‹N°›</a:t>
             </a:fld>
             <a:endParaRPr lang="fr-FR"/>
@@ -3750,7 +3790,8 @@
           <a:p>
             <a:fld id="{B09A78FF-4AD8-4119-9AEB-2EBDEBEAE2E7}" type="datetimeFigureOut">
               <a:rPr lang="fr-FR" smtClean="0"/>
-              <a:t>20/04/2016</a:t>
+              <a:pPr/>
+              <a:t>21/04/2016</a:t>
             </a:fld>
             <a:endParaRPr lang="fr-FR"/>
           </a:p>
@@ -3802,6 +3843,7 @@
           <a:p>
             <a:fld id="{360FC94D-EAAC-4AD0-BE8D-24600246B7D2}" type="slidenum">
               <a:rPr lang="fr-FR" smtClean="0"/>
+              <a:pPr/>
               <a:t>‹N°›</a:t>
             </a:fld>
             <a:endParaRPr lang="fr-FR"/>
@@ -3992,7 +4034,8 @@
           <a:p>
             <a:fld id="{B09A78FF-4AD8-4119-9AEB-2EBDEBEAE2E7}" type="datetimeFigureOut">
               <a:rPr lang="fr-FR" smtClean="0"/>
-              <a:t>20/04/2016</a:t>
+              <a:pPr/>
+              <a:t>21/04/2016</a:t>
             </a:fld>
             <a:endParaRPr lang="fr-FR"/>
           </a:p>
@@ -4034,6 +4077,7 @@
           <a:p>
             <a:fld id="{360FC94D-EAAC-4AD0-BE8D-24600246B7D2}" type="slidenum">
               <a:rPr lang="fr-FR" smtClean="0"/>
+              <a:pPr/>
               <a:t>‹N°›</a:t>
             </a:fld>
             <a:endParaRPr lang="fr-FR"/>
@@ -4371,7 +4415,8 @@
           <a:p>
             <a:fld id="{B09A78FF-4AD8-4119-9AEB-2EBDEBEAE2E7}" type="datetimeFigureOut">
               <a:rPr lang="fr-FR" smtClean="0"/>
-              <a:t>20/04/2016</a:t>
+              <a:pPr/>
+              <a:t>21/04/2016</a:t>
             </a:fld>
             <a:endParaRPr lang="fr-FR"/>
           </a:p>
@@ -4413,6 +4458,7 @@
           <a:p>
             <a:fld id="{360FC94D-EAAC-4AD0-BE8D-24600246B7D2}" type="slidenum">
               <a:rPr lang="fr-FR" smtClean="0"/>
+              <a:pPr/>
               <a:t>‹N°›</a:t>
             </a:fld>
             <a:endParaRPr lang="fr-FR"/>
@@ -4489,7 +4535,8 @@
           <a:p>
             <a:fld id="{B09A78FF-4AD8-4119-9AEB-2EBDEBEAE2E7}" type="datetimeFigureOut">
               <a:rPr lang="fr-FR" smtClean="0"/>
-              <a:t>20/04/2016</a:t>
+              <a:pPr/>
+              <a:t>21/04/2016</a:t>
             </a:fld>
             <a:endParaRPr lang="fr-FR"/>
           </a:p>
@@ -4531,6 +4578,7 @@
           <a:p>
             <a:fld id="{360FC94D-EAAC-4AD0-BE8D-24600246B7D2}" type="slidenum">
               <a:rPr lang="fr-FR" smtClean="0"/>
+              <a:pPr/>
               <a:t>‹N°›</a:t>
             </a:fld>
             <a:endParaRPr lang="fr-FR"/>
@@ -4584,7 +4632,8 @@
           <a:p>
             <a:fld id="{B09A78FF-4AD8-4119-9AEB-2EBDEBEAE2E7}" type="datetimeFigureOut">
               <a:rPr lang="fr-FR" smtClean="0"/>
-              <a:t>20/04/2016</a:t>
+              <a:pPr/>
+              <a:t>21/04/2016</a:t>
             </a:fld>
             <a:endParaRPr lang="fr-FR"/>
           </a:p>
@@ -4626,6 +4675,7 @@
           <a:p>
             <a:fld id="{360FC94D-EAAC-4AD0-BE8D-24600246B7D2}" type="slidenum">
               <a:rPr lang="fr-FR" smtClean="0"/>
+              <a:pPr/>
               <a:t>‹N°›</a:t>
             </a:fld>
             <a:endParaRPr lang="fr-FR"/>
@@ -4833,7 +4883,8 @@
           <a:p>
             <a:fld id="{B09A78FF-4AD8-4119-9AEB-2EBDEBEAE2E7}" type="datetimeFigureOut">
               <a:rPr lang="fr-FR" smtClean="0"/>
-              <a:t>20/04/2016</a:t>
+              <a:pPr/>
+              <a:t>21/04/2016</a:t>
             </a:fld>
             <a:endParaRPr lang="fr-FR"/>
           </a:p>
@@ -4875,6 +4926,7 @@
           <a:p>
             <a:fld id="{360FC94D-EAAC-4AD0-BE8D-24600246B7D2}" type="slidenum">
               <a:rPr lang="fr-FR" smtClean="0"/>
+              <a:pPr/>
               <a:t>‹N°›</a:t>
             </a:fld>
             <a:endParaRPr lang="fr-FR"/>
@@ -5090,7 +5142,8 @@
           <a:p>
             <a:fld id="{B09A78FF-4AD8-4119-9AEB-2EBDEBEAE2E7}" type="datetimeFigureOut">
               <a:rPr lang="fr-FR" smtClean="0"/>
-              <a:t>20/04/2016</a:t>
+              <a:pPr/>
+              <a:t>21/04/2016</a:t>
             </a:fld>
             <a:endParaRPr lang="fr-FR"/>
           </a:p>
@@ -5132,6 +5185,7 @@
           <a:p>
             <a:fld id="{360FC94D-EAAC-4AD0-BE8D-24600246B7D2}" type="slidenum">
               <a:rPr lang="fr-FR" smtClean="0"/>
+              <a:pPr/>
               <a:t>‹N°›</a:t>
             </a:fld>
             <a:endParaRPr lang="fr-FR"/>
@@ -5333,7 +5387,8 @@
           <a:p>
             <a:fld id="{B09A78FF-4AD8-4119-9AEB-2EBDEBEAE2E7}" type="datetimeFigureOut">
               <a:rPr lang="fr-FR" smtClean="0"/>
-              <a:t>20/04/2016</a:t>
+              <a:pPr/>
+              <a:t>21/04/2016</a:t>
             </a:fld>
             <a:endParaRPr lang="fr-FR"/>
           </a:p>
@@ -5411,6 +5466,7 @@
           <a:p>
             <a:fld id="{360FC94D-EAAC-4AD0-BE8D-24600246B7D2}" type="slidenum">
               <a:rPr lang="fr-FR" smtClean="0"/>
+              <a:pPr/>
               <a:t>‹N°›</a:t>
             </a:fld>
             <a:endParaRPr lang="fr-FR"/>
@@ -5756,7 +5812,7 @@
         </p:nvSpPr>
         <p:spPr>
           <a:xfrm>
-            <a:off x="2062223" y="845395"/>
+            <a:off x="2374643" y="3329515"/>
             <a:ext cx="8610600" cy="1293028"/>
           </a:xfrm>
         </p:spPr>
@@ -5807,10 +5863,374 @@
   <p:clrMapOvr>
     <a:masterClrMapping/>
   </p:clrMapOvr>
+  <p:timing>
+    <p:tnLst>
+      <p:par>
+        <p:cTn id="1" dur="indefinite" restart="never" nodeType="tmRoot"/>
+      </p:par>
+    </p:tnLst>
+  </p:timing>
 </p:sld>
 </file>
 
 <file path=ppt/slides/slide2.xml><?xml version="1.0" encoding="utf-8"?>
+<p:sld xmlns:a="http://schemas.openxmlformats.org/drawingml/2006/main" xmlns:r="http://schemas.openxmlformats.org/officeDocument/2006/relationships" xmlns:p="http://schemas.openxmlformats.org/presentationml/2006/main">
+  <p:cSld>
+    <p:spTree>
+      <p:nvGrpSpPr>
+        <p:cNvPr id="1" name=""/>
+        <p:cNvGrpSpPr/>
+        <p:nvPr/>
+      </p:nvGrpSpPr>
+      <p:grpSpPr>
+        <a:xfrm>
+          <a:off x="0" y="0"/>
+          <a:ext cx="0" cy="0"/>
+          <a:chOff x="0" y="0"/>
+          <a:chExt cx="0" cy="0"/>
+        </a:xfrm>
+      </p:grpSpPr>
+      <p:sp>
+        <p:nvSpPr>
+          <p:cNvPr id="2" name="Titre 1"/>
+          <p:cNvSpPr>
+            <a:spLocks noGrp="1"/>
+          </p:cNvSpPr>
+          <p:nvPr>
+            <p:ph type="title"/>
+          </p:nvPr>
+        </p:nvSpPr>
+        <p:spPr/>
+        <p:txBody>
+          <a:bodyPr>
+            <a:scene3d>
+              <a:camera prst="obliqueTopLeft"/>
+              <a:lightRig rig="threePt" dir="t"/>
+            </a:scene3d>
+          </a:bodyPr>
+          <a:lstStyle/>
+          <a:p>
+            <a:r>
+              <a:rPr lang="fr-FR" dirty="0" smtClean="0">
+                <a:effectLst>
+                  <a:outerShdw blurRad="60007" dist="200025" dir="15000000" sy="30000" kx="-1800000" algn="bl" rotWithShape="0">
+                    <a:prstClr val="black">
+                      <a:alpha val="32000"/>
+                    </a:prstClr>
+                  </a:outerShdw>
+                </a:effectLst>
+                <a:latin typeface="Source Sans Pro" panose="020B0503030403020204" pitchFamily="34" charset="0"/>
+              </a:rPr>
+              <a:t>But DU PROJET</a:t>
+            </a:r>
+            <a:endParaRPr lang="fr-FR" dirty="0">
+              <a:effectLst>
+                <a:outerShdw blurRad="60007" dist="200025" dir="15000000" sy="30000" kx="-1800000" algn="bl" rotWithShape="0">
+                  <a:prstClr val="black">
+                    <a:alpha val="32000"/>
+                  </a:prstClr>
+                </a:outerShdw>
+              </a:effectLst>
+              <a:latin typeface="Source Sans Pro" panose="020B0503030403020204" pitchFamily="34" charset="0"/>
+            </a:endParaRPr>
+          </a:p>
+        </p:txBody>
+      </p:sp>
+      <p:sp>
+        <p:nvSpPr>
+          <p:cNvPr id="3" name="Espace réservé du contenu 2"/>
+          <p:cNvSpPr>
+            <a:spLocks noGrp="1"/>
+          </p:cNvSpPr>
+          <p:nvPr>
+            <p:ph idx="1"/>
+          </p:nvPr>
+        </p:nvSpPr>
+        <p:spPr/>
+        <p:txBody>
+          <a:bodyPr/>
+          <a:lstStyle/>
+          <a:p>
+            <a:endParaRPr lang="fr-FR" dirty="0" smtClean="0">
+              <a:latin typeface="Source Sans Pro" panose="020B0503030403020204" pitchFamily="34" charset="0"/>
+            </a:endParaRPr>
+          </a:p>
+          <a:p>
+            <a:endParaRPr lang="fr-FR" dirty="0" smtClean="0">
+              <a:latin typeface="Source Sans Pro" panose="020B0503030403020204" pitchFamily="34" charset="0"/>
+            </a:endParaRPr>
+          </a:p>
+          <a:p>
+            <a:r>
+              <a:rPr lang="fr-FR" dirty="0" smtClean="0">
+                <a:latin typeface="Source Sans Pro" panose="020B0503030403020204" pitchFamily="34" charset="0"/>
+              </a:rPr>
+              <a:t>Faire un jeu en mode console</a:t>
+            </a:r>
+          </a:p>
+          <a:p>
+            <a:endParaRPr lang="fr-FR" dirty="0" smtClean="0">
+              <a:latin typeface="Source Sans Pro" panose="020B0503030403020204" pitchFamily="34" charset="0"/>
+            </a:endParaRPr>
+          </a:p>
+          <a:p>
+            <a:r>
+              <a:rPr lang="fr-FR" dirty="0" smtClean="0">
+                <a:latin typeface="Source Sans Pro" panose="020B0503030403020204" pitchFamily="34" charset="0"/>
+              </a:rPr>
+              <a:t>Coder avec une architecture MVC ( </a:t>
+            </a:r>
+            <a:r>
+              <a:rPr lang="fr-FR" dirty="0" err="1" smtClean="0">
+                <a:latin typeface="Source Sans Pro" panose="020B0503030403020204" pitchFamily="34" charset="0"/>
+              </a:rPr>
+              <a:t>Models</a:t>
+            </a:r>
+            <a:r>
+              <a:rPr lang="fr-FR" dirty="0" smtClean="0">
+                <a:latin typeface="Source Sans Pro" panose="020B0503030403020204" pitchFamily="34" charset="0"/>
+              </a:rPr>
+              <a:t>/ </a:t>
+            </a:r>
+            <a:r>
+              <a:rPr lang="fr-FR" dirty="0" err="1" smtClean="0">
+                <a:latin typeface="Source Sans Pro" panose="020B0503030403020204" pitchFamily="34" charset="0"/>
+              </a:rPr>
+              <a:t>Views</a:t>
+            </a:r>
+            <a:r>
+              <a:rPr lang="fr-FR" dirty="0" smtClean="0">
+                <a:latin typeface="Source Sans Pro" panose="020B0503030403020204" pitchFamily="34" charset="0"/>
+              </a:rPr>
+              <a:t> / </a:t>
+            </a:r>
+            <a:r>
+              <a:rPr lang="fr-FR" dirty="0" err="1" smtClean="0">
+                <a:latin typeface="Source Sans Pro" panose="020B0503030403020204" pitchFamily="34" charset="0"/>
+              </a:rPr>
+              <a:t>Controllers</a:t>
+            </a:r>
+            <a:r>
+              <a:rPr lang="fr-FR" dirty="0" smtClean="0">
+                <a:latin typeface="Source Sans Pro" panose="020B0503030403020204" pitchFamily="34" charset="0"/>
+              </a:rPr>
+              <a:t>)</a:t>
+            </a:r>
+          </a:p>
+          <a:p>
+            <a:endParaRPr lang="fr-FR" dirty="0" smtClean="0">
+              <a:latin typeface="Source Sans Pro" panose="020B0503030403020204" pitchFamily="34" charset="0"/>
+            </a:endParaRPr>
+          </a:p>
+          <a:p>
+            <a:r>
+              <a:rPr lang="fr-FR" dirty="0" smtClean="0">
+                <a:latin typeface="Source Sans Pro" panose="020B0503030403020204" pitchFamily="34" charset="0"/>
+              </a:rPr>
+              <a:t>Utilisation des langages </a:t>
+            </a:r>
+            <a:r>
+              <a:rPr lang="fr-FR" dirty="0" smtClean="0">
+                <a:latin typeface="Source Sans Pro" panose="020B0503030403020204" pitchFamily="34" charset="0"/>
+              </a:rPr>
+              <a:t>JAVA , C# ou C++</a:t>
+            </a:r>
+            <a:endParaRPr lang="fr-FR" dirty="0">
+              <a:latin typeface="Source Sans Pro" panose="020B0503030403020204" pitchFamily="34" charset="0"/>
+            </a:endParaRPr>
+          </a:p>
+        </p:txBody>
+      </p:sp>
+    </p:spTree>
+  </p:cSld>
+  <p:clrMapOvr>
+    <a:masterClrMapping/>
+  </p:clrMapOvr>
+  <p:timing>
+    <p:tnLst>
+      <p:par>
+        <p:cTn id="1" dur="indefinite" restart="never" nodeType="tmRoot"/>
+      </p:par>
+    </p:tnLst>
+  </p:timing>
+</p:sld>
+</file>
+
+<file path=ppt/slides/slide3.xml><?xml version="1.0" encoding="utf-8"?>
+<p:sld xmlns:a="http://schemas.openxmlformats.org/drawingml/2006/main" xmlns:r="http://schemas.openxmlformats.org/officeDocument/2006/relationships" xmlns:p="http://schemas.openxmlformats.org/presentationml/2006/main">
+  <p:cSld>
+    <p:spTree>
+      <p:nvGrpSpPr>
+        <p:cNvPr id="1" name=""/>
+        <p:cNvGrpSpPr/>
+        <p:nvPr/>
+      </p:nvGrpSpPr>
+      <p:grpSpPr>
+        <a:xfrm>
+          <a:off x="0" y="0"/>
+          <a:ext cx="0" cy="0"/>
+          <a:chOff x="0" y="0"/>
+          <a:chExt cx="0" cy="0"/>
+        </a:xfrm>
+      </p:grpSpPr>
+      <p:sp>
+        <p:nvSpPr>
+          <p:cNvPr id="2" name="Titre 1"/>
+          <p:cNvSpPr>
+            <a:spLocks noGrp="1"/>
+          </p:cNvSpPr>
+          <p:nvPr>
+            <p:ph type="title"/>
+          </p:nvPr>
+        </p:nvSpPr>
+        <p:spPr/>
+        <p:txBody>
+          <a:bodyPr/>
+          <a:lstStyle/>
+          <a:p>
+            <a:r>
+              <a:rPr lang="fr-FR" dirty="0" smtClean="0">
+                <a:effectLst>
+                  <a:outerShdw blurRad="60007" dist="200025" dir="15000000" sy="30000" kx="-1800000" algn="bl" rotWithShape="0">
+                    <a:prstClr val="black">
+                      <a:alpha val="32000"/>
+                    </a:prstClr>
+                  </a:outerShdw>
+                </a:effectLst>
+                <a:latin typeface="Source Sans Pro" panose="020B0503030403020204" pitchFamily="34" charset="0"/>
+              </a:rPr>
+              <a:t>Description du Jeu</a:t>
+            </a:r>
+            <a:endParaRPr lang="fr-FR" dirty="0">
+              <a:effectLst>
+                <a:outerShdw blurRad="60007" dist="200025" dir="15000000" sy="30000" kx="-1800000" algn="bl" rotWithShape="0">
+                  <a:prstClr val="black">
+                    <a:alpha val="32000"/>
+                  </a:prstClr>
+                </a:outerShdw>
+              </a:effectLst>
+              <a:latin typeface="Source Sans Pro" panose="020B0503030403020204" pitchFamily="34" charset="0"/>
+            </a:endParaRPr>
+          </a:p>
+        </p:txBody>
+      </p:sp>
+      <p:sp>
+        <p:nvSpPr>
+          <p:cNvPr id="3" name="Espace réservé du contenu 2"/>
+          <p:cNvSpPr>
+            <a:spLocks noGrp="1"/>
+          </p:cNvSpPr>
+          <p:nvPr>
+            <p:ph idx="1"/>
+          </p:nvPr>
+        </p:nvSpPr>
+        <p:spPr/>
+        <p:txBody>
+          <a:bodyPr/>
+          <a:lstStyle/>
+          <a:p>
+            <a:endParaRPr lang="fr-FR" dirty="0" smtClean="0">
+              <a:latin typeface="Source Sans Pro" panose="020B0503030403020204" pitchFamily="34" charset="0"/>
+            </a:endParaRPr>
+          </a:p>
+          <a:p>
+            <a:r>
+              <a:rPr lang="fr-FR" dirty="0" smtClean="0">
+                <a:latin typeface="Source Sans Pro" panose="020B0503030403020204" pitchFamily="34" charset="0"/>
+              </a:rPr>
+              <a:t>Type de jeu: RUNNER</a:t>
+            </a:r>
+          </a:p>
+          <a:p>
+            <a:endParaRPr lang="fr-FR" dirty="0" smtClean="0">
+              <a:latin typeface="Source Sans Pro" panose="020B0503030403020204" pitchFamily="34" charset="0"/>
+            </a:endParaRPr>
+          </a:p>
+          <a:p>
+            <a:endParaRPr lang="fr-FR" dirty="0" smtClean="0">
+              <a:latin typeface="Source Sans Pro" panose="020B0503030403020204" pitchFamily="34" charset="0"/>
+            </a:endParaRPr>
+          </a:p>
+          <a:p>
+            <a:pPr lvl="1"/>
+            <a:r>
+              <a:rPr lang="fr-FR" dirty="0" smtClean="0">
+                <a:latin typeface="Source Sans Pro" panose="020B0503030403020204" pitchFamily="34" charset="0"/>
+              </a:rPr>
+              <a:t>Jeu de plateforme : </a:t>
+            </a:r>
+            <a:r>
+              <a:rPr lang="fr-FR" dirty="0" err="1" smtClean="0">
+                <a:latin typeface="Source Sans Pro" panose="020B0503030403020204" pitchFamily="34" charset="0"/>
+              </a:rPr>
+              <a:t>endless</a:t>
+            </a:r>
+            <a:r>
+              <a:rPr lang="fr-FR" dirty="0" smtClean="0">
+                <a:latin typeface="Source Sans Pro" panose="020B0503030403020204" pitchFamily="34" charset="0"/>
+              </a:rPr>
+              <a:t> running</a:t>
+            </a:r>
+          </a:p>
+          <a:p>
+            <a:pPr lvl="1"/>
+            <a:endParaRPr lang="fr-FR" dirty="0" smtClean="0">
+              <a:latin typeface="Source Sans Pro" panose="020B0503030403020204" pitchFamily="34" charset="0"/>
+            </a:endParaRPr>
+          </a:p>
+          <a:p>
+            <a:pPr lvl="1"/>
+            <a:endParaRPr lang="fr-FR" dirty="0" smtClean="0">
+              <a:latin typeface="Source Sans Pro" panose="020B0503030403020204" pitchFamily="34" charset="0"/>
+            </a:endParaRPr>
+          </a:p>
+          <a:p>
+            <a:pPr lvl="1"/>
+            <a:r>
+              <a:rPr lang="fr-FR" dirty="0" smtClean="0">
+                <a:latin typeface="Source Sans Pro" panose="020B0503030403020204" pitchFamily="34" charset="0"/>
+              </a:rPr>
+              <a:t>Vue horizontal</a:t>
+            </a:r>
+          </a:p>
+          <a:p>
+            <a:pPr lvl="1"/>
+            <a:endParaRPr lang="fr-FR" dirty="0" smtClean="0"/>
+          </a:p>
+          <a:p>
+            <a:pPr lvl="1"/>
+            <a:endParaRPr lang="fr-FR" dirty="0" smtClean="0"/>
+          </a:p>
+          <a:p>
+            <a:pPr lvl="1"/>
+            <a:endParaRPr lang="fr-FR" dirty="0" smtClean="0"/>
+          </a:p>
+          <a:p>
+            <a:pPr lvl="1"/>
+            <a:endParaRPr lang="fr-FR" dirty="0" smtClean="0"/>
+          </a:p>
+          <a:p>
+            <a:pPr lvl="1"/>
+            <a:endParaRPr lang="fr-FR" dirty="0" smtClean="0"/>
+          </a:p>
+        </p:txBody>
+      </p:sp>
+    </p:spTree>
+  </p:cSld>
+  <p:clrMapOvr>
+    <a:masterClrMapping/>
+  </p:clrMapOvr>
+  <p:timing>
+    <p:tnLst>
+      <p:par>
+        <p:cTn id="1" dur="indefinite" restart="never" nodeType="tmRoot"/>
+      </p:par>
+    </p:tnLst>
+  </p:timing>
+</p:sld>
+</file>
+
+<file path=ppt/slides/slide4.xml><?xml version="1.0" encoding="utf-8"?>
 <p:sld xmlns:a="http://schemas.openxmlformats.org/drawingml/2006/main" xmlns:r="http://schemas.openxmlformats.org/officeDocument/2006/relationships" xmlns:p="http://schemas.openxmlformats.org/presentationml/2006/main">
   <p:cSld>
     <p:spTree>
@@ -5865,10 +6285,17 @@
   <p:clrMapOvr>
     <a:masterClrMapping/>
   </p:clrMapOvr>
+  <p:timing>
+    <p:tnLst>
+      <p:par>
+        <p:cTn id="1" dur="indefinite" restart="never" nodeType="tmRoot"/>
+      </p:par>
+    </p:tnLst>
+  </p:timing>
 </p:sld>
 </file>
 
-<file path=ppt/slides/slide3.xml><?xml version="1.0" encoding="utf-8"?>
+<file path=ppt/slides/slide5.xml><?xml version="1.0" encoding="utf-8"?>
 <p:sld xmlns:a="http://schemas.openxmlformats.org/drawingml/2006/main" xmlns:r="http://schemas.openxmlformats.org/officeDocument/2006/relationships" xmlns:p="http://schemas.openxmlformats.org/presentationml/2006/main">
   <p:cSld>
     <p:spTree>
@@ -5919,10 +6346,17 @@
   <p:clrMapOvr>
     <a:masterClrMapping/>
   </p:clrMapOvr>
+  <p:timing>
+    <p:tnLst>
+      <p:par>
+        <p:cTn id="1" dur="indefinite" restart="never" nodeType="tmRoot"/>
+      </p:par>
+    </p:tnLst>
+  </p:timing>
 </p:sld>
 </file>
 
-<file path=ppt/slides/slide4.xml><?xml version="1.0" encoding="utf-8"?>
+<file path=ppt/slides/slide6.xml><?xml version="1.0" encoding="utf-8"?>
 <p:sld xmlns:a="http://schemas.openxmlformats.org/drawingml/2006/main" xmlns:r="http://schemas.openxmlformats.org/officeDocument/2006/relationships" xmlns:p="http://schemas.openxmlformats.org/presentationml/2006/main">
   <p:cSld>
     <p:spTree>
@@ -5973,10 +6407,17 @@
   <p:clrMapOvr>
     <a:masterClrMapping/>
   </p:clrMapOvr>
+  <p:timing>
+    <p:tnLst>
+      <p:par>
+        <p:cTn id="1" dur="indefinite" restart="never" nodeType="tmRoot"/>
+      </p:par>
+    </p:tnLst>
+  </p:timing>
 </p:sld>
 </file>
 
-<file path=ppt/slides/slide5.xml><?xml version="1.0" encoding="utf-8"?>
+<file path=ppt/slides/slide7.xml><?xml version="1.0" encoding="utf-8"?>
 <p:sld xmlns:a="http://schemas.openxmlformats.org/drawingml/2006/main" xmlns:r="http://schemas.openxmlformats.org/officeDocument/2006/relationships" xmlns:p="http://schemas.openxmlformats.org/presentationml/2006/main">
   <p:cSld>
     <p:spTree>
@@ -6027,6 +6468,369 @@
   <p:clrMapOvr>
     <a:masterClrMapping/>
   </p:clrMapOvr>
+  <p:timing>
+    <p:tnLst>
+      <p:par>
+        <p:cTn id="1" dur="indefinite" restart="never" nodeType="tmRoot"/>
+      </p:par>
+    </p:tnLst>
+  </p:timing>
+</p:sld>
+</file>
+
+<file path=ppt/slides/slide8.xml><?xml version="1.0" encoding="utf-8"?>
+<p:sld xmlns:a="http://schemas.openxmlformats.org/drawingml/2006/main" xmlns:r="http://schemas.openxmlformats.org/officeDocument/2006/relationships" xmlns:p="http://schemas.openxmlformats.org/presentationml/2006/main">
+  <p:cSld>
+    <p:spTree>
+      <p:nvGrpSpPr>
+        <p:cNvPr id="1" name=""/>
+        <p:cNvGrpSpPr/>
+        <p:nvPr/>
+      </p:nvGrpSpPr>
+      <p:grpSpPr>
+        <a:xfrm>
+          <a:off x="0" y="0"/>
+          <a:ext cx="0" cy="0"/>
+          <a:chOff x="0" y="0"/>
+          <a:chExt cx="0" cy="0"/>
+        </a:xfrm>
+      </p:grpSpPr>
+      <p:sp>
+        <p:nvSpPr>
+          <p:cNvPr id="2" name="Titre 1"/>
+          <p:cNvSpPr>
+            <a:spLocks noGrp="1"/>
+          </p:cNvSpPr>
+          <p:nvPr>
+            <p:ph type="title"/>
+          </p:nvPr>
+        </p:nvSpPr>
+        <p:spPr/>
+        <p:txBody>
+          <a:bodyPr/>
+          <a:lstStyle/>
+          <a:p>
+            <a:r>
+              <a:rPr lang="fr-FR" dirty="0" smtClean="0">
+                <a:effectLst>
+                  <a:outerShdw blurRad="60007" dist="200025" dir="15000000" sy="30000" kx="-1800000" algn="bl" rotWithShape="0">
+                    <a:prstClr val="black">
+                      <a:alpha val="32000"/>
+                    </a:prstClr>
+                  </a:outerShdw>
+                </a:effectLst>
+                <a:latin typeface="Source Sans Pro" panose="020B0503030403020204" pitchFamily="34" charset="0"/>
+              </a:rPr>
+              <a:t>Difficultés </a:t>
+            </a:r>
+            <a:r>
+              <a:rPr lang="fr-FR" dirty="0" err="1" smtClean="0">
+                <a:effectLst>
+                  <a:outerShdw blurRad="60007" dist="200025" dir="15000000" sy="30000" kx="-1800000" algn="bl" rotWithShape="0">
+                    <a:prstClr val="black">
+                      <a:alpha val="32000"/>
+                    </a:prstClr>
+                  </a:outerShdw>
+                </a:effectLst>
+                <a:latin typeface="Source Sans Pro" panose="020B0503030403020204" pitchFamily="34" charset="0"/>
+              </a:rPr>
+              <a:t>RENCONTRéeS</a:t>
+            </a:r>
+            <a:r>
+              <a:rPr lang="fr-FR" dirty="0" smtClean="0">
+                <a:effectLst>
+                  <a:outerShdw blurRad="60007" dist="200025" dir="15000000" sy="30000" kx="-1800000" algn="bl" rotWithShape="0">
+                    <a:prstClr val="black">
+                      <a:alpha val="32000"/>
+                    </a:prstClr>
+                  </a:outerShdw>
+                </a:effectLst>
+                <a:latin typeface="Source Sans Pro" panose="020B0503030403020204" pitchFamily="34" charset="0"/>
+              </a:rPr>
+              <a:t> </a:t>
+            </a:r>
+            <a:endParaRPr lang="fr-FR" dirty="0">
+              <a:effectLst>
+                <a:outerShdw blurRad="60007" dist="200025" dir="15000000" sy="30000" kx="-1800000" algn="bl" rotWithShape="0">
+                  <a:prstClr val="black">
+                    <a:alpha val="32000"/>
+                  </a:prstClr>
+                </a:outerShdw>
+              </a:effectLst>
+              <a:latin typeface="Source Sans Pro" panose="020B0503030403020204" pitchFamily="34" charset="0"/>
+            </a:endParaRPr>
+          </a:p>
+        </p:txBody>
+      </p:sp>
+      <p:sp>
+        <p:nvSpPr>
+          <p:cNvPr id="3" name="Espace réservé du contenu 2"/>
+          <p:cNvSpPr>
+            <a:spLocks noGrp="1"/>
+          </p:cNvSpPr>
+          <p:nvPr>
+            <p:ph idx="1"/>
+          </p:nvPr>
+        </p:nvSpPr>
+        <p:spPr/>
+        <p:txBody>
+          <a:bodyPr/>
+          <a:lstStyle/>
+          <a:p>
+            <a:endParaRPr lang="fr-FR" dirty="0" smtClean="0">
+              <a:latin typeface="Source Sans Pro" panose="020B0503030403020204" pitchFamily="34" charset="0"/>
+            </a:endParaRPr>
+          </a:p>
+          <a:p>
+            <a:r>
+              <a:rPr lang="fr-FR" dirty="0" smtClean="0">
+                <a:latin typeface="Source Sans Pro" panose="020B0503030403020204" pitchFamily="34" charset="0"/>
+              </a:rPr>
+              <a:t>Conception de </a:t>
+            </a:r>
+            <a:r>
+              <a:rPr lang="fr-FR" dirty="0" smtClean="0">
+                <a:latin typeface="Source Sans Pro" panose="020B0503030403020204" pitchFamily="34" charset="0"/>
+              </a:rPr>
+              <a:t>l’architecture MVC</a:t>
+            </a:r>
+          </a:p>
+          <a:p>
+            <a:endParaRPr lang="fr-FR" dirty="0" smtClean="0">
+              <a:latin typeface="Source Sans Pro" panose="020B0503030403020204" pitchFamily="34" charset="0"/>
+            </a:endParaRPr>
+          </a:p>
+          <a:p>
+            <a:r>
+              <a:rPr lang="fr-FR" dirty="0" smtClean="0">
+                <a:latin typeface="Source Sans Pro" panose="020B0503030403020204" pitchFamily="34" charset="0"/>
+              </a:rPr>
+              <a:t>Les événements clavier en mode console</a:t>
+            </a:r>
+          </a:p>
+          <a:p>
+            <a:endParaRPr lang="fr-FR" dirty="0" smtClean="0">
+              <a:latin typeface="Source Sans Pro" panose="020B0503030403020204" pitchFamily="34" charset="0"/>
+            </a:endParaRPr>
+          </a:p>
+          <a:p>
+            <a:r>
+              <a:rPr lang="fr-FR" dirty="0" smtClean="0">
+                <a:latin typeface="Source Sans Pro" panose="020B0503030403020204" pitchFamily="34" charset="0"/>
+              </a:rPr>
+              <a:t>Problèmes de compilation entre deux </a:t>
+            </a:r>
+            <a:r>
+              <a:rPr lang="fr-FR" dirty="0" smtClean="0">
+                <a:latin typeface="Source Sans Pro" panose="020B0503030403020204" pitchFamily="34" charset="0"/>
+              </a:rPr>
+              <a:t>IDLE différents</a:t>
+            </a:r>
+            <a:endParaRPr lang="fr-FR" dirty="0" smtClean="0">
+              <a:latin typeface="Source Sans Pro" panose="020B0503030403020204" pitchFamily="34" charset="0"/>
+            </a:endParaRPr>
+          </a:p>
+          <a:p>
+            <a:endParaRPr lang="fr-FR" dirty="0" smtClean="0"/>
+          </a:p>
+          <a:p>
+            <a:endParaRPr lang="fr-FR" dirty="0"/>
+          </a:p>
+        </p:txBody>
+      </p:sp>
+    </p:spTree>
+  </p:cSld>
+  <p:clrMapOvr>
+    <a:masterClrMapping/>
+  </p:clrMapOvr>
+  <p:timing>
+    <p:tnLst>
+      <p:par>
+        <p:cTn id="1" dur="indefinite" restart="never" nodeType="tmRoot"/>
+      </p:par>
+    </p:tnLst>
+  </p:timing>
+</p:sld>
+</file>
+
+<file path=ppt/slides/slide9.xml><?xml version="1.0" encoding="utf-8"?>
+<p:sld xmlns:a="http://schemas.openxmlformats.org/drawingml/2006/main" xmlns:r="http://schemas.openxmlformats.org/officeDocument/2006/relationships" xmlns:p="http://schemas.openxmlformats.org/presentationml/2006/main">
+  <p:cSld>
+    <p:spTree>
+      <p:nvGrpSpPr>
+        <p:cNvPr id="1" name=""/>
+        <p:cNvGrpSpPr/>
+        <p:nvPr/>
+      </p:nvGrpSpPr>
+      <p:grpSpPr>
+        <a:xfrm>
+          <a:off x="0" y="0"/>
+          <a:ext cx="0" cy="0"/>
+          <a:chOff x="0" y="0"/>
+          <a:chExt cx="0" cy="0"/>
+        </a:xfrm>
+      </p:grpSpPr>
+      <p:sp>
+        <p:nvSpPr>
+          <p:cNvPr id="2" name="Titre 1"/>
+          <p:cNvSpPr>
+            <a:spLocks noGrp="1"/>
+          </p:cNvSpPr>
+          <p:nvPr>
+            <p:ph type="title"/>
+          </p:nvPr>
+        </p:nvSpPr>
+        <p:spPr/>
+        <p:txBody>
+          <a:bodyPr/>
+          <a:lstStyle/>
+          <a:p>
+            <a:r>
+              <a:rPr lang="fr-FR" dirty="0" smtClean="0">
+                <a:effectLst>
+                  <a:outerShdw blurRad="60007" dist="200025" dir="15000000" sy="30000" kx="-1800000" algn="bl" rotWithShape="0">
+                    <a:prstClr val="black">
+                      <a:alpha val="32000"/>
+                    </a:prstClr>
+                  </a:outerShdw>
+                </a:effectLst>
+                <a:latin typeface="Source Sans Pro" panose="020B0503030403020204" pitchFamily="34" charset="0"/>
+              </a:rPr>
+              <a:t>Améliorations possibles</a:t>
+            </a:r>
+            <a:endParaRPr lang="fr-FR" dirty="0">
+              <a:effectLst>
+                <a:outerShdw blurRad="60007" dist="200025" dir="15000000" sy="30000" kx="-1800000" algn="bl" rotWithShape="0">
+                  <a:prstClr val="black">
+                    <a:alpha val="32000"/>
+                  </a:prstClr>
+                </a:outerShdw>
+              </a:effectLst>
+              <a:latin typeface="Source Sans Pro" panose="020B0503030403020204" pitchFamily="34" charset="0"/>
+            </a:endParaRPr>
+          </a:p>
+        </p:txBody>
+      </p:sp>
+      <p:sp>
+        <p:nvSpPr>
+          <p:cNvPr id="3" name="Espace réservé du contenu 2"/>
+          <p:cNvSpPr>
+            <a:spLocks noGrp="1"/>
+          </p:cNvSpPr>
+          <p:nvPr>
+            <p:ph idx="1"/>
+          </p:nvPr>
+        </p:nvSpPr>
+        <p:spPr/>
+        <p:txBody>
+          <a:bodyPr/>
+          <a:lstStyle/>
+          <a:p>
+            <a:endParaRPr lang="fr-FR" dirty="0" smtClean="0">
+              <a:latin typeface="Source Sans Pro" panose="020B0503030403020204" pitchFamily="34" charset="0"/>
+            </a:endParaRPr>
+          </a:p>
+          <a:p>
+            <a:endParaRPr lang="fr-FR" dirty="0" smtClean="0">
+              <a:latin typeface="Source Sans Pro" panose="020B0503030403020204" pitchFamily="34" charset="0"/>
+            </a:endParaRPr>
+          </a:p>
+          <a:p>
+            <a:r>
+              <a:rPr lang="fr-FR" dirty="0" smtClean="0">
+                <a:latin typeface="Source Sans Pro" panose="020B0503030403020204" pitchFamily="34" charset="0"/>
+              </a:rPr>
+              <a:t>Ajout et affichage de </a:t>
+            </a:r>
+            <a:r>
+              <a:rPr lang="fr-FR" dirty="0" smtClean="0">
+                <a:latin typeface="Source Sans Pro" panose="020B0503030403020204" pitchFamily="34" charset="0"/>
+              </a:rPr>
+              <a:t>la</a:t>
+            </a:r>
+            <a:r>
+              <a:rPr lang="fr-FR" dirty="0" smtClean="0">
+                <a:latin typeface="Source Sans Pro" panose="020B0503030403020204" pitchFamily="34" charset="0"/>
+              </a:rPr>
+              <a:t> </a:t>
+            </a:r>
+            <a:r>
+              <a:rPr lang="fr-FR" dirty="0" smtClean="0">
+                <a:latin typeface="Source Sans Pro" panose="020B0503030403020204" pitchFamily="34" charset="0"/>
+              </a:rPr>
+              <a:t>sauvegarde </a:t>
+            </a:r>
+            <a:r>
+              <a:rPr lang="fr-FR" dirty="0" smtClean="0">
+                <a:latin typeface="Source Sans Pro" panose="020B0503030403020204" pitchFamily="34" charset="0"/>
+              </a:rPr>
+              <a:t>du meilleur </a:t>
+            </a:r>
+            <a:r>
+              <a:rPr lang="fr-FR" dirty="0" smtClean="0">
+                <a:latin typeface="Source Sans Pro" panose="020B0503030403020204" pitchFamily="34" charset="0"/>
+              </a:rPr>
+              <a:t>score</a:t>
+            </a:r>
+          </a:p>
+          <a:p>
+            <a:endParaRPr lang="fr-FR" dirty="0" smtClean="0">
+              <a:latin typeface="Source Sans Pro" panose="020B0503030403020204" pitchFamily="34" charset="0"/>
+            </a:endParaRPr>
+          </a:p>
+          <a:p>
+            <a:r>
+              <a:rPr lang="fr-FR" dirty="0" smtClean="0">
+                <a:latin typeface="Source Sans Pro" panose="020B0503030403020204" pitchFamily="34" charset="0"/>
+              </a:rPr>
+              <a:t>Interface </a:t>
+            </a:r>
+            <a:r>
+              <a:rPr lang="fr-FR" dirty="0" smtClean="0">
+                <a:latin typeface="Source Sans Pro" panose="020B0503030403020204" pitchFamily="34" charset="0"/>
+              </a:rPr>
+              <a:t>graphique </a:t>
+            </a:r>
+            <a:endParaRPr lang="fr-FR" dirty="0" smtClean="0">
+              <a:latin typeface="Source Sans Pro" panose="020B0503030403020204" pitchFamily="34" charset="0"/>
+            </a:endParaRPr>
+          </a:p>
+          <a:p>
+            <a:endParaRPr lang="fr-FR" dirty="0" smtClean="0">
+              <a:latin typeface="Source Sans Pro" panose="020B0503030403020204" pitchFamily="34" charset="0"/>
+            </a:endParaRPr>
+          </a:p>
+          <a:p>
+            <a:r>
+              <a:rPr lang="fr-FR" dirty="0" smtClean="0">
+                <a:latin typeface="Source Sans Pro" panose="020B0503030403020204" pitchFamily="34" charset="0"/>
+              </a:rPr>
+              <a:t>Partie à deux </a:t>
+            </a:r>
+            <a:r>
+              <a:rPr lang="fr-FR" dirty="0" smtClean="0">
+                <a:latin typeface="Source Sans Pro" panose="020B0503030403020204" pitchFamily="34" charset="0"/>
+              </a:rPr>
+              <a:t>joueurs</a:t>
+            </a:r>
+            <a:endParaRPr lang="fr-FR" dirty="0">
+              <a:latin typeface="Source Sans Pro" panose="020B0503030403020204" pitchFamily="34" charset="0"/>
+            </a:endParaRPr>
+          </a:p>
+        </p:txBody>
+      </p:sp>
+    </p:spTree>
+  </p:cSld>
+  <p:clrMapOvr>
+    <a:masterClrMapping/>
+  </p:clrMapOvr>
+  <p:timing>
+    <p:tnLst>
+      <p:par>
+        <p:cTn id="1" dur="indefinite" restart="never" nodeType="tmRoot"/>
+      </p:par>
+    </p:tnLst>
+  </p:timing>
 </p:sld>
 </file>
 
@@ -6073,7 +6877,7 @@
     </a:clrScheme>
     <a:fontScheme name="Traînée de condensation">
       <a:majorFont>
-        <a:latin typeface="Century Gothic" panose="020B0502020202020204"/>
+        <a:latin typeface="Century Gothic"/>
         <a:ea typeface=""/>
         <a:cs typeface=""/>
         <a:font script="Jpan" typeface="ＭＳ Ｐゴシック"/>
@@ -6108,7 +6912,7 @@
         <a:font script="Geor" typeface="Sylfaen"/>
       </a:majorFont>
       <a:minorFont>
-        <a:latin typeface="Century Gothic" panose="020B0502020202020204"/>
+        <a:latin typeface="Century Gothic"/>
         <a:ea typeface=""/>
         <a:cs typeface=""/>
         <a:font script="Jpan" typeface="ＭＳ Ｐゴシック"/>

</xml_diff>